<commit_message>
update lectures to have correct module
</commit_message>
<xml_diff>
--- a/assets/lectures/cshl/2019/mini/RNASeq_MiniLecture_01_01_FASTA_FASTQ_GTF.pptx
+++ b/assets/lectures/cshl/2019/mini/RNASeq_MiniLecture_01_01_FASTA_FASTQ_GTF.pptx
@@ -204,7 +204,7 @@
           <a:p>
             <a:fld id="{827BD9F9-8452-A342-BB1B-28ECF19E2CC5}" type="datetimeFigureOut">
               <a:rPr lang="en-US" smtClean="0"/>
-              <a:t>11/5/19</a:t>
+              <a:t>11/9/19</a:t>
             </a:fld>
             <a:endParaRPr lang="en-US"/>
           </a:p>
@@ -1167,7 +1167,7 @@
           <a:p>
             <a:fld id="{C764DE79-268F-4C1A-8933-263129D2AF90}" type="datetimeFigureOut">
               <a:rPr lang="en-US" smtClean="0"/>
-              <a:t>11/5/19</a:t>
+              <a:t>11/9/19</a:t>
             </a:fld>
             <a:endParaRPr lang="en-US" dirty="0"/>
           </a:p>
@@ -1316,14 +1316,14 @@
           </a:ln>
           <a:extLst>
             <a:ext uri="{909E8E84-426E-40dd-AFC4-6F175D3DCCD1}">
-              <a14:hiddenFill xmlns:a14="http://schemas.microsoft.com/office/drawing/2010/main" xmlns="">
+              <a14:hiddenFill xmlns="" xmlns:a14="http://schemas.microsoft.com/office/drawing/2010/main">
                 <a:solidFill>
                   <a:srgbClr val="FFFFFF"/>
                 </a:solidFill>
               </a14:hiddenFill>
             </a:ext>
             <a:ext uri="{91240B29-F687-4f45-9708-019B960494DF}">
-              <a14:hiddenLine xmlns:a14="http://schemas.microsoft.com/office/drawing/2010/main" xmlns="" w="9525">
+              <a14:hiddenLine xmlns="" xmlns:a14="http://schemas.microsoft.com/office/drawing/2010/main" w="9525">
                 <a:solidFill>
                   <a:srgbClr val="000000"/>
                 </a:solidFill>
@@ -1457,7 +1457,7 @@
           <a:p>
             <a:fld id="{C764DE79-268F-4C1A-8933-263129D2AF90}" type="datetimeFigureOut">
               <a:rPr lang="en-US" smtClean="0"/>
-              <a:t>11/5/19</a:t>
+              <a:t>11/9/19</a:t>
             </a:fld>
             <a:endParaRPr lang="en-US" dirty="0"/>
           </a:p>
@@ -1637,7 +1637,7 @@
           <a:p>
             <a:fld id="{C764DE79-268F-4C1A-8933-263129D2AF90}" type="datetimeFigureOut">
               <a:rPr lang="en-US" smtClean="0"/>
-              <a:t>11/5/19</a:t>
+              <a:t>11/9/19</a:t>
             </a:fld>
             <a:endParaRPr lang="en-US" dirty="0"/>
           </a:p>
@@ -1805,14 +1805,14 @@
           </a:ln>
           <a:extLst>
             <a:ext uri="{909E8E84-426E-40dd-AFC4-6F175D3DCCD1}">
-              <a14:hiddenFill xmlns:a14="http://schemas.microsoft.com/office/drawing/2010/main" xmlns="">
+              <a14:hiddenFill xmlns="" xmlns:a14="http://schemas.microsoft.com/office/drawing/2010/main">
                 <a:solidFill>
                   <a:srgbClr val="FFFFFF"/>
                 </a:solidFill>
               </a14:hiddenFill>
             </a:ext>
             <a:ext uri="{91240B29-F687-4f45-9708-019B960494DF}">
-              <a14:hiddenLine xmlns:a14="http://schemas.microsoft.com/office/drawing/2010/main" xmlns="" w="9525">
+              <a14:hiddenLine xmlns="" xmlns:a14="http://schemas.microsoft.com/office/drawing/2010/main" w="9525">
                 <a:solidFill>
                   <a:srgbClr val="000000"/>
                 </a:solidFill>
@@ -2407,7 +2407,7 @@
           <a:p>
             <a:fld id="{C764DE79-268F-4C1A-8933-263129D2AF90}" type="datetimeFigureOut">
               <a:rPr lang="en-US" smtClean="0"/>
-              <a:t>11/5/19</a:t>
+              <a:t>11/9/19</a:t>
             </a:fld>
             <a:endParaRPr lang="en-US" dirty="0"/>
           </a:p>
@@ -2653,7 +2653,7 @@
           <a:p>
             <a:fld id="{C764DE79-268F-4C1A-8933-263129D2AF90}" type="datetimeFigureOut">
               <a:rPr lang="en-US" smtClean="0"/>
-              <a:t>11/5/19</a:t>
+              <a:t>11/9/19</a:t>
             </a:fld>
             <a:endParaRPr lang="en-US" dirty="0"/>
           </a:p>
@@ -2885,7 +2885,7 @@
           <a:p>
             <a:fld id="{C764DE79-268F-4C1A-8933-263129D2AF90}" type="datetimeFigureOut">
               <a:rPr lang="en-US" smtClean="0"/>
-              <a:t>11/5/19</a:t>
+              <a:t>11/9/19</a:t>
             </a:fld>
             <a:endParaRPr lang="en-US" dirty="0"/>
           </a:p>
@@ -3252,7 +3252,7 @@
           <a:p>
             <a:fld id="{C764DE79-268F-4C1A-8933-263129D2AF90}" type="datetimeFigureOut">
               <a:rPr lang="en-US" smtClean="0"/>
-              <a:t>11/5/19</a:t>
+              <a:t>11/9/19</a:t>
             </a:fld>
             <a:endParaRPr lang="en-US" dirty="0"/>
           </a:p>
@@ -3370,7 +3370,7 @@
           <a:p>
             <a:fld id="{C764DE79-268F-4C1A-8933-263129D2AF90}" type="datetimeFigureOut">
               <a:rPr lang="en-US" smtClean="0"/>
-              <a:t>11/5/19</a:t>
+              <a:t>11/9/19</a:t>
             </a:fld>
             <a:endParaRPr lang="en-US" dirty="0"/>
           </a:p>
@@ -3465,7 +3465,7 @@
           <a:p>
             <a:fld id="{C764DE79-268F-4C1A-8933-263129D2AF90}" type="datetimeFigureOut">
               <a:rPr lang="en-US" smtClean="0"/>
-              <a:t>11/5/19</a:t>
+              <a:t>11/9/19</a:t>
             </a:fld>
             <a:endParaRPr lang="en-US" dirty="0"/>
           </a:p>
@@ -3742,7 +3742,7 @@
           <a:p>
             <a:fld id="{C764DE79-268F-4C1A-8933-263129D2AF90}" type="datetimeFigureOut">
               <a:rPr lang="en-US" smtClean="0"/>
-              <a:t>11/5/19</a:t>
+              <a:t>11/9/19</a:t>
             </a:fld>
             <a:endParaRPr lang="en-US" dirty="0"/>
           </a:p>
@@ -3999,7 +3999,7 @@
           <a:p>
             <a:fld id="{C764DE79-268F-4C1A-8933-263129D2AF90}" type="datetimeFigureOut">
               <a:rPr lang="en-US" smtClean="0"/>
-              <a:t>11/5/19</a:t>
+              <a:t>11/9/19</a:t>
             </a:fld>
             <a:endParaRPr lang="en-US" dirty="0"/>
           </a:p>
@@ -4212,7 +4212,7 @@
           <a:p>
             <a:fld id="{C764DE79-268F-4C1A-8933-263129D2AF90}" type="datetimeFigureOut">
               <a:rPr lang="en-US" smtClean="0"/>
-              <a:t>11/5/19</a:t>
+              <a:t>11/9/19</a:t>
             </a:fld>
             <a:endParaRPr lang="en-US" dirty="0"/>
           </a:p>
@@ -4523,14 +4523,14 @@
           </a:ln>
           <a:extLst>
             <a:ext uri="{909E8E84-426E-40dd-AFC4-6F175D3DCCD1}">
-              <a14:hiddenFill xmlns:a14="http://schemas.microsoft.com/office/drawing/2010/main" xmlns="">
+              <a14:hiddenFill xmlns="" xmlns:a14="http://schemas.microsoft.com/office/drawing/2010/main">
                 <a:solidFill>
                   <a:srgbClr val="FFFFFF"/>
                 </a:solidFill>
               </a14:hiddenFill>
             </a:ext>
             <a:ext uri="{91240B29-F687-4f45-9708-019B960494DF}">
-              <a14:hiddenLine xmlns:a14="http://schemas.microsoft.com/office/drawing/2010/main" xmlns="" w="9525">
+              <a14:hiddenLine xmlns="" xmlns:a14="http://schemas.microsoft.com/office/drawing/2010/main" w="9525">
                 <a:solidFill>
                   <a:srgbClr val="000000"/>
                 </a:solidFill>
@@ -5233,14 +5233,14 @@
           </a:ln>
           <a:extLst>
             <a:ext uri="{909E8E84-426E-40dd-AFC4-6F175D3DCCD1}">
-              <a14:hiddenFill xmlns:a14="http://schemas.microsoft.com/office/drawing/2010/main" xmlns="">
+              <a14:hiddenFill xmlns="" xmlns:a14="http://schemas.microsoft.com/office/drawing/2010/main">
                 <a:solidFill>
                   <a:srgbClr val="FFFFFF"/>
                 </a:solidFill>
               </a14:hiddenFill>
             </a:ext>
             <a:ext uri="{91240B29-F687-4f45-9708-019B960494DF}">
-              <a14:hiddenLine xmlns:a14="http://schemas.microsoft.com/office/drawing/2010/main" xmlns="" w="9525">
+              <a14:hiddenLine xmlns="" xmlns:a14="http://schemas.microsoft.com/office/drawing/2010/main" w="9525">
                 <a:solidFill>
                   <a:srgbClr val="000000"/>
                 </a:solidFill>
@@ -5274,14 +5274,14 @@
           </a:ln>
           <a:extLst>
             <a:ext uri="{909E8E84-426E-40dd-AFC4-6F175D3DCCD1}">
-              <a14:hiddenFill xmlns:a14="http://schemas.microsoft.com/office/drawing/2010/main" xmlns="">
+              <a14:hiddenFill xmlns="" xmlns:a14="http://schemas.microsoft.com/office/drawing/2010/main">
                 <a:solidFill>
                   <a:srgbClr val="FFFFFF"/>
                 </a:solidFill>
               </a14:hiddenFill>
             </a:ext>
             <a:ext uri="{91240B29-F687-4f45-9708-019B960494DF}">
-              <a14:hiddenLine xmlns:a14="http://schemas.microsoft.com/office/drawing/2010/main" xmlns="" w="9525">
+              <a14:hiddenLine xmlns="" xmlns:a14="http://schemas.microsoft.com/office/drawing/2010/main" w="9525">
                 <a:solidFill>
                   <a:srgbClr val="000000"/>
                 </a:solidFill>
@@ -5412,7 +5412,20 @@
                 <a:latin typeface="Calibri" charset="0"/>
                 <a:cs typeface="Segoe UI" charset="0"/>
               </a:rPr>
-              <a:t>Introduction to cloud computing</a:t>
+              <a:t>Module 1:</a:t>
+            </a:r>
+          </a:p>
+          <a:p>
+            <a:pPr algn="r" eaLnBrk="1" hangingPunct="1"/>
+            <a:r>
+              <a:rPr lang="en-US" sz="2000" b="1">
+                <a:solidFill>
+                  <a:schemeClr val="bg1"/>
+                </a:solidFill>
+                <a:latin typeface="Calibri" charset="0"/>
+                <a:cs typeface="Segoe UI" charset="0"/>
+              </a:rPr>
+              <a:t>FASTA/FASTQ/GTF</a:t>
             </a:r>
             <a:endParaRPr lang="en-US" sz="1800" b="1" dirty="0">
               <a:solidFill>

</xml_diff>

<commit_message>
update module number on bottom of slide
</commit_message>
<xml_diff>
--- a/assets/lectures/cshl/2019/mini/RNASeq_MiniLecture_01_01_FASTA_FASTQ_GTF.pptx
+++ b/assets/lectures/cshl/2019/mini/RNASeq_MiniLecture_01_01_FASTA_FASTQ_GTF.pptx
@@ -1316,14 +1316,14 @@
           </a:ln>
           <a:extLst>
             <a:ext uri="{909E8E84-426E-40dd-AFC4-6F175D3DCCD1}">
-              <a14:hiddenFill xmlns="" xmlns:a14="http://schemas.microsoft.com/office/drawing/2010/main">
+              <a14:hiddenFill xmlns:a14="http://schemas.microsoft.com/office/drawing/2010/main" xmlns="">
                 <a:solidFill>
                   <a:srgbClr val="FFFFFF"/>
                 </a:solidFill>
               </a14:hiddenFill>
             </a:ext>
             <a:ext uri="{91240B29-F687-4f45-9708-019B960494DF}">
-              <a14:hiddenLine xmlns="" xmlns:a14="http://schemas.microsoft.com/office/drawing/2010/main" w="9525">
+              <a14:hiddenLine xmlns:a14="http://schemas.microsoft.com/office/drawing/2010/main" xmlns="" w="9525">
                 <a:solidFill>
                   <a:srgbClr val="000000"/>
                 </a:solidFill>
@@ -1805,14 +1805,14 @@
           </a:ln>
           <a:extLst>
             <a:ext uri="{909E8E84-426E-40dd-AFC4-6F175D3DCCD1}">
-              <a14:hiddenFill xmlns="" xmlns:a14="http://schemas.microsoft.com/office/drawing/2010/main">
+              <a14:hiddenFill xmlns:a14="http://schemas.microsoft.com/office/drawing/2010/main" xmlns="">
                 <a:solidFill>
                   <a:srgbClr val="FFFFFF"/>
                 </a:solidFill>
               </a14:hiddenFill>
             </a:ext>
             <a:ext uri="{91240B29-F687-4f45-9708-019B960494DF}">
-              <a14:hiddenLine xmlns="" xmlns:a14="http://schemas.microsoft.com/office/drawing/2010/main" w="9525">
+              <a14:hiddenLine xmlns:a14="http://schemas.microsoft.com/office/drawing/2010/main" xmlns="" w="9525">
                 <a:solidFill>
                   <a:srgbClr val="000000"/>
                 </a:solidFill>
@@ -4523,14 +4523,14 @@
           </a:ln>
           <a:extLst>
             <a:ext uri="{909E8E84-426E-40dd-AFC4-6F175D3DCCD1}">
-              <a14:hiddenFill xmlns="" xmlns:a14="http://schemas.microsoft.com/office/drawing/2010/main">
+              <a14:hiddenFill xmlns:a14="http://schemas.microsoft.com/office/drawing/2010/main" xmlns="">
                 <a:solidFill>
                   <a:srgbClr val="FFFFFF"/>
                 </a:solidFill>
               </a14:hiddenFill>
             </a:ext>
             <a:ext uri="{91240B29-F687-4f45-9708-019B960494DF}">
-              <a14:hiddenLine xmlns="" xmlns:a14="http://schemas.microsoft.com/office/drawing/2010/main" w="9525">
+              <a14:hiddenLine xmlns:a14="http://schemas.microsoft.com/office/drawing/2010/main" xmlns="" w="9525">
                 <a:solidFill>
                   <a:srgbClr val="000000"/>
                 </a:solidFill>
@@ -4665,7 +4665,7 @@
                 <a:latin typeface="Calibri" charset="0"/>
                 <a:cs typeface="Calibri" charset="0"/>
               </a:rPr>
-              <a:t>Module 2 </a:t>
+              <a:t>Module 1 </a:t>
             </a:r>
           </a:p>
         </p:txBody>
@@ -5233,14 +5233,14 @@
           </a:ln>
           <a:extLst>
             <a:ext uri="{909E8E84-426E-40dd-AFC4-6F175D3DCCD1}">
-              <a14:hiddenFill xmlns="" xmlns:a14="http://schemas.microsoft.com/office/drawing/2010/main">
+              <a14:hiddenFill xmlns:a14="http://schemas.microsoft.com/office/drawing/2010/main" xmlns="">
                 <a:solidFill>
                   <a:srgbClr val="FFFFFF"/>
                 </a:solidFill>
               </a14:hiddenFill>
             </a:ext>
             <a:ext uri="{91240B29-F687-4f45-9708-019B960494DF}">
-              <a14:hiddenLine xmlns="" xmlns:a14="http://schemas.microsoft.com/office/drawing/2010/main" w="9525">
+              <a14:hiddenLine xmlns:a14="http://schemas.microsoft.com/office/drawing/2010/main" xmlns="" w="9525">
                 <a:solidFill>
                   <a:srgbClr val="000000"/>
                 </a:solidFill>
@@ -5274,14 +5274,14 @@
           </a:ln>
           <a:extLst>
             <a:ext uri="{909E8E84-426E-40dd-AFC4-6F175D3DCCD1}">
-              <a14:hiddenFill xmlns="" xmlns:a14="http://schemas.microsoft.com/office/drawing/2010/main">
+              <a14:hiddenFill xmlns:a14="http://schemas.microsoft.com/office/drawing/2010/main" xmlns="">
                 <a:solidFill>
                   <a:srgbClr val="FFFFFF"/>
                 </a:solidFill>
               </a14:hiddenFill>
             </a:ext>
             <a:ext uri="{91240B29-F687-4f45-9708-019B960494DF}">
-              <a14:hiddenLine xmlns="" xmlns:a14="http://schemas.microsoft.com/office/drawing/2010/main" w="9525">
+              <a14:hiddenLine xmlns:a14="http://schemas.microsoft.com/office/drawing/2010/main" xmlns="" w="9525">
                 <a:solidFill>
                   <a:srgbClr val="000000"/>
                 </a:solidFill>

</xml_diff>

<commit_message>
more fixes to the slide masters
</commit_message>
<xml_diff>
--- a/assets/lectures/cshl/2019/mini/RNASeq_MiniLecture_01_01_FASTA_FASTQ_GTF.pptx
+++ b/assets/lectures/cshl/2019/mini/RNASeq_MiniLecture_01_01_FASTA_FASTQ_GTF.pptx
@@ -1244,7 +1244,15 @@
             <p:ph type="dt" sz="half" idx="10"/>
           </p:nvPr>
         </p:nvSpPr>
-        <p:spPr/>
+        <p:spPr>
+          <a:xfrm>
+            <a:off x="838200" y="6356350"/>
+            <a:ext cx="2743200" cy="365125"/>
+          </a:xfrm>
+          <a:prstGeom prst="rect">
+            <a:avLst/>
+          </a:prstGeom>
+        </p:spPr>
         <p:txBody>
           <a:bodyPr/>
           <a:lstStyle/>
@@ -1267,7 +1275,15 @@
             <p:ph type="ftr" sz="quarter" idx="11"/>
           </p:nvPr>
         </p:nvSpPr>
-        <p:spPr/>
+        <p:spPr>
+          <a:xfrm>
+            <a:off x="4038600" y="6356350"/>
+            <a:ext cx="4114800" cy="365125"/>
+          </a:xfrm>
+          <a:prstGeom prst="rect">
+            <a:avLst/>
+          </a:prstGeom>
+        </p:spPr>
         <p:txBody>
           <a:bodyPr/>
           <a:lstStyle/>
@@ -1286,7 +1302,15 @@
             <p:ph type="sldNum" sz="quarter" idx="12"/>
           </p:nvPr>
         </p:nvSpPr>
-        <p:spPr/>
+        <p:spPr>
+          <a:xfrm>
+            <a:off x="8610600" y="6356350"/>
+            <a:ext cx="2743200" cy="365125"/>
+          </a:xfrm>
+          <a:prstGeom prst="rect">
+            <a:avLst/>
+          </a:prstGeom>
+        </p:spPr>
         <p:txBody>
           <a:bodyPr/>
           <a:lstStyle/>
@@ -1400,14 +1424,14 @@
           </a:ln>
           <a:extLst>
             <a:ext uri="{909E8E84-426E-40dd-AFC4-6F175D3DCCD1}">
-              <a14:hiddenFill xmlns="" xmlns:a14="http://schemas.microsoft.com/office/drawing/2010/main">
+              <a14:hiddenFill xmlns:a14="http://schemas.microsoft.com/office/drawing/2010/main" xmlns="">
                 <a:solidFill>
                   <a:srgbClr val="FFFFFF"/>
                 </a:solidFill>
               </a14:hiddenFill>
             </a:ext>
             <a:ext uri="{91240B29-F687-4f45-9708-019B960494DF}">
-              <a14:hiddenLine xmlns="" xmlns:a14="http://schemas.microsoft.com/office/drawing/2010/main" w="9525">
+              <a14:hiddenLine xmlns:a14="http://schemas.microsoft.com/office/drawing/2010/main" xmlns="" w="9525">
                 <a:solidFill>
                   <a:srgbClr val="000000"/>
                 </a:solidFill>
@@ -1545,14 +1569,14 @@
           </a:ln>
           <a:extLst>
             <a:ext uri="{909E8E84-426E-40dd-AFC4-6F175D3DCCD1}">
-              <a14:hiddenFill xmlns="" xmlns:a14="http://schemas.microsoft.com/office/drawing/2010/main">
+              <a14:hiddenFill xmlns:a14="http://schemas.microsoft.com/office/drawing/2010/main" xmlns="">
                 <a:solidFill>
                   <a:srgbClr val="FFFFFF"/>
                 </a:solidFill>
               </a14:hiddenFill>
             </a:ext>
             <a:ext uri="{91240B29-F687-4f45-9708-019B960494DF}">
-              <a14:hiddenLine xmlns="" xmlns:a14="http://schemas.microsoft.com/office/drawing/2010/main" w="9525">
+              <a14:hiddenLine xmlns:a14="http://schemas.microsoft.com/office/drawing/2010/main" xmlns="" w="9525">
                 <a:solidFill>
                   <a:srgbClr val="000000"/>
                 </a:solidFill>
@@ -1679,7 +1703,15 @@
             <p:ph type="dt" sz="half" idx="10"/>
           </p:nvPr>
         </p:nvSpPr>
-        <p:spPr/>
+        <p:spPr>
+          <a:xfrm>
+            <a:off x="838200" y="6356350"/>
+            <a:ext cx="2743200" cy="365125"/>
+          </a:xfrm>
+          <a:prstGeom prst="rect">
+            <a:avLst/>
+          </a:prstGeom>
+        </p:spPr>
         <p:txBody>
           <a:bodyPr/>
           <a:lstStyle/>
@@ -1702,7 +1734,15 @@
             <p:ph type="ftr" sz="quarter" idx="11"/>
           </p:nvPr>
         </p:nvSpPr>
-        <p:spPr/>
+        <p:spPr>
+          <a:xfrm>
+            <a:off x="4038600" y="6356350"/>
+            <a:ext cx="4114800" cy="365125"/>
+          </a:xfrm>
+          <a:prstGeom prst="rect">
+            <a:avLst/>
+          </a:prstGeom>
+        </p:spPr>
         <p:txBody>
           <a:bodyPr/>
           <a:lstStyle/>
@@ -1721,7 +1761,15 @@
             <p:ph type="sldNum" sz="quarter" idx="12"/>
           </p:nvPr>
         </p:nvSpPr>
-        <p:spPr/>
+        <p:spPr>
+          <a:xfrm>
+            <a:off x="8610600" y="6356350"/>
+            <a:ext cx="2743200" cy="365125"/>
+          </a:xfrm>
+          <a:prstGeom prst="rect">
+            <a:avLst/>
+          </a:prstGeom>
+        </p:spPr>
         <p:txBody>
           <a:bodyPr/>
           <a:lstStyle/>
@@ -1925,7 +1973,15 @@
             <p:ph type="dt" sz="half" idx="10"/>
           </p:nvPr>
         </p:nvSpPr>
-        <p:spPr/>
+        <p:spPr>
+          <a:xfrm>
+            <a:off x="838200" y="6356350"/>
+            <a:ext cx="2743200" cy="365125"/>
+          </a:xfrm>
+          <a:prstGeom prst="rect">
+            <a:avLst/>
+          </a:prstGeom>
+        </p:spPr>
         <p:txBody>
           <a:bodyPr/>
           <a:lstStyle/>
@@ -1948,7 +2004,15 @@
             <p:ph type="ftr" sz="quarter" idx="11"/>
           </p:nvPr>
         </p:nvSpPr>
-        <p:spPr/>
+        <p:spPr>
+          <a:xfrm>
+            <a:off x="4038600" y="6356350"/>
+            <a:ext cx="4114800" cy="365125"/>
+          </a:xfrm>
+          <a:prstGeom prst="rect">
+            <a:avLst/>
+          </a:prstGeom>
+        </p:spPr>
         <p:txBody>
           <a:bodyPr/>
           <a:lstStyle/>
@@ -1967,7 +2031,15 @@
             <p:ph type="sldNum" sz="quarter" idx="12"/>
           </p:nvPr>
         </p:nvSpPr>
-        <p:spPr/>
+        <p:spPr>
+          <a:xfrm>
+            <a:off x="8610600" y="6356350"/>
+            <a:ext cx="2743200" cy="365125"/>
+          </a:xfrm>
+          <a:prstGeom prst="rect">
+            <a:avLst/>
+          </a:prstGeom>
+        </p:spPr>
         <p:txBody>
           <a:bodyPr/>
           <a:lstStyle/>
@@ -2157,7 +2229,15 @@
             <p:ph type="dt" sz="half" idx="10"/>
           </p:nvPr>
         </p:nvSpPr>
-        <p:spPr/>
+        <p:spPr>
+          <a:xfrm>
+            <a:off x="838200" y="6356350"/>
+            <a:ext cx="2743200" cy="365125"/>
+          </a:xfrm>
+          <a:prstGeom prst="rect">
+            <a:avLst/>
+          </a:prstGeom>
+        </p:spPr>
         <p:txBody>
           <a:bodyPr/>
           <a:lstStyle/>
@@ -2180,7 +2260,15 @@
             <p:ph type="ftr" sz="quarter" idx="11"/>
           </p:nvPr>
         </p:nvSpPr>
-        <p:spPr/>
+        <p:spPr>
+          <a:xfrm>
+            <a:off x="4038600" y="6356350"/>
+            <a:ext cx="4114800" cy="365125"/>
+          </a:xfrm>
+          <a:prstGeom prst="rect">
+            <a:avLst/>
+          </a:prstGeom>
+        </p:spPr>
         <p:txBody>
           <a:bodyPr/>
           <a:lstStyle/>
@@ -2199,7 +2287,15 @@
             <p:ph type="sldNum" sz="quarter" idx="12"/>
           </p:nvPr>
         </p:nvSpPr>
-        <p:spPr/>
+        <p:spPr>
+          <a:xfrm>
+            <a:off x="8610600" y="6356350"/>
+            <a:ext cx="2743200" cy="365125"/>
+          </a:xfrm>
+          <a:prstGeom prst="rect">
+            <a:avLst/>
+          </a:prstGeom>
+        </p:spPr>
         <p:txBody>
           <a:bodyPr/>
           <a:lstStyle/>
@@ -2524,7 +2620,15 @@
             <p:ph type="dt" sz="half" idx="10"/>
           </p:nvPr>
         </p:nvSpPr>
-        <p:spPr/>
+        <p:spPr>
+          <a:xfrm>
+            <a:off x="838200" y="6356350"/>
+            <a:ext cx="2743200" cy="365125"/>
+          </a:xfrm>
+          <a:prstGeom prst="rect">
+            <a:avLst/>
+          </a:prstGeom>
+        </p:spPr>
         <p:txBody>
           <a:bodyPr/>
           <a:lstStyle/>
@@ -2547,7 +2651,15 @@
             <p:ph type="ftr" sz="quarter" idx="11"/>
           </p:nvPr>
         </p:nvSpPr>
-        <p:spPr/>
+        <p:spPr>
+          <a:xfrm>
+            <a:off x="4038600" y="6356350"/>
+            <a:ext cx="4114800" cy="365125"/>
+          </a:xfrm>
+          <a:prstGeom prst="rect">
+            <a:avLst/>
+          </a:prstGeom>
+        </p:spPr>
         <p:txBody>
           <a:bodyPr/>
           <a:lstStyle/>
@@ -2566,7 +2678,15 @@
             <p:ph type="sldNum" sz="quarter" idx="12"/>
           </p:nvPr>
         </p:nvSpPr>
-        <p:spPr/>
+        <p:spPr>
+          <a:xfrm>
+            <a:off x="8610600" y="6356350"/>
+            <a:ext cx="2743200" cy="365125"/>
+          </a:xfrm>
+          <a:prstGeom prst="rect">
+            <a:avLst/>
+          </a:prstGeom>
+        </p:spPr>
         <p:txBody>
           <a:bodyPr/>
           <a:lstStyle/>
@@ -2642,7 +2762,15 @@
             <p:ph type="dt" sz="half" idx="10"/>
           </p:nvPr>
         </p:nvSpPr>
-        <p:spPr/>
+        <p:spPr>
+          <a:xfrm>
+            <a:off x="838200" y="6356350"/>
+            <a:ext cx="2743200" cy="365125"/>
+          </a:xfrm>
+          <a:prstGeom prst="rect">
+            <a:avLst/>
+          </a:prstGeom>
+        </p:spPr>
         <p:txBody>
           <a:bodyPr/>
           <a:lstStyle/>
@@ -2665,7 +2793,15 @@
             <p:ph type="ftr" sz="quarter" idx="11"/>
           </p:nvPr>
         </p:nvSpPr>
-        <p:spPr/>
+        <p:spPr>
+          <a:xfrm>
+            <a:off x="4038600" y="6356350"/>
+            <a:ext cx="4114800" cy="365125"/>
+          </a:xfrm>
+          <a:prstGeom prst="rect">
+            <a:avLst/>
+          </a:prstGeom>
+        </p:spPr>
         <p:txBody>
           <a:bodyPr/>
           <a:lstStyle/>
@@ -2684,7 +2820,15 @@
             <p:ph type="sldNum" sz="quarter" idx="12"/>
           </p:nvPr>
         </p:nvSpPr>
-        <p:spPr/>
+        <p:spPr>
+          <a:xfrm>
+            <a:off x="8610600" y="6356350"/>
+            <a:ext cx="2743200" cy="365125"/>
+          </a:xfrm>
+          <a:prstGeom prst="rect">
+            <a:avLst/>
+          </a:prstGeom>
+        </p:spPr>
         <p:txBody>
           <a:bodyPr/>
           <a:lstStyle/>
@@ -2737,7 +2881,15 @@
             <p:ph type="dt" sz="half" idx="10"/>
           </p:nvPr>
         </p:nvSpPr>
-        <p:spPr/>
+        <p:spPr>
+          <a:xfrm>
+            <a:off x="838200" y="6356350"/>
+            <a:ext cx="2743200" cy="365125"/>
+          </a:xfrm>
+          <a:prstGeom prst="rect">
+            <a:avLst/>
+          </a:prstGeom>
+        </p:spPr>
         <p:txBody>
           <a:bodyPr/>
           <a:lstStyle/>
@@ -2760,7 +2912,15 @@
             <p:ph type="ftr" sz="quarter" idx="11"/>
           </p:nvPr>
         </p:nvSpPr>
-        <p:spPr/>
+        <p:spPr>
+          <a:xfrm>
+            <a:off x="4038600" y="6356350"/>
+            <a:ext cx="4114800" cy="365125"/>
+          </a:xfrm>
+          <a:prstGeom prst="rect">
+            <a:avLst/>
+          </a:prstGeom>
+        </p:spPr>
         <p:txBody>
           <a:bodyPr/>
           <a:lstStyle/>
@@ -2779,7 +2939,15 @@
             <p:ph type="sldNum" sz="quarter" idx="12"/>
           </p:nvPr>
         </p:nvSpPr>
-        <p:spPr/>
+        <p:spPr>
+          <a:xfrm>
+            <a:off x="8610600" y="6356350"/>
+            <a:ext cx="2743200" cy="365125"/>
+          </a:xfrm>
+          <a:prstGeom prst="rect">
+            <a:avLst/>
+          </a:prstGeom>
+        </p:spPr>
         <p:txBody>
           <a:bodyPr/>
           <a:lstStyle/>
@@ -3014,7 +3182,15 @@
             <p:ph type="dt" sz="half" idx="10"/>
           </p:nvPr>
         </p:nvSpPr>
-        <p:spPr/>
+        <p:spPr>
+          <a:xfrm>
+            <a:off x="838200" y="6356350"/>
+            <a:ext cx="2743200" cy="365125"/>
+          </a:xfrm>
+          <a:prstGeom prst="rect">
+            <a:avLst/>
+          </a:prstGeom>
+        </p:spPr>
         <p:txBody>
           <a:bodyPr/>
           <a:lstStyle/>
@@ -3037,7 +3213,15 @@
             <p:ph type="ftr" sz="quarter" idx="11"/>
           </p:nvPr>
         </p:nvSpPr>
-        <p:spPr/>
+        <p:spPr>
+          <a:xfrm>
+            <a:off x="4038600" y="6356350"/>
+            <a:ext cx="4114800" cy="365125"/>
+          </a:xfrm>
+          <a:prstGeom prst="rect">
+            <a:avLst/>
+          </a:prstGeom>
+        </p:spPr>
         <p:txBody>
           <a:bodyPr/>
           <a:lstStyle/>
@@ -3056,7 +3240,15 @@
             <p:ph type="sldNum" sz="quarter" idx="12"/>
           </p:nvPr>
         </p:nvSpPr>
-        <p:spPr/>
+        <p:spPr>
+          <a:xfrm>
+            <a:off x="8610600" y="6356350"/>
+            <a:ext cx="2743200" cy="365125"/>
+          </a:xfrm>
+          <a:prstGeom prst="rect">
+            <a:avLst/>
+          </a:prstGeom>
+        </p:spPr>
         <p:txBody>
           <a:bodyPr/>
           <a:lstStyle/>
@@ -3271,7 +3463,15 @@
             <p:ph type="dt" sz="half" idx="10"/>
           </p:nvPr>
         </p:nvSpPr>
-        <p:spPr/>
+        <p:spPr>
+          <a:xfrm>
+            <a:off x="838200" y="6356350"/>
+            <a:ext cx="2743200" cy="365125"/>
+          </a:xfrm>
+          <a:prstGeom prst="rect">
+            <a:avLst/>
+          </a:prstGeom>
+        </p:spPr>
         <p:txBody>
           <a:bodyPr/>
           <a:lstStyle/>
@@ -3294,7 +3494,15 @@
             <p:ph type="ftr" sz="quarter" idx="11"/>
           </p:nvPr>
         </p:nvSpPr>
-        <p:spPr/>
+        <p:spPr>
+          <a:xfrm>
+            <a:off x="4038600" y="6356350"/>
+            <a:ext cx="4114800" cy="365125"/>
+          </a:xfrm>
+          <a:prstGeom prst="rect">
+            <a:avLst/>
+          </a:prstGeom>
+        </p:spPr>
         <p:txBody>
           <a:bodyPr/>
           <a:lstStyle/>
@@ -3313,7 +3521,15 @@
             <p:ph type="sldNum" sz="quarter" idx="12"/>
           </p:nvPr>
         </p:nvSpPr>
-        <p:spPr/>
+        <p:spPr>
+          <a:xfrm>
+            <a:off x="8610600" y="6356350"/>
+            <a:ext cx="2743200" cy="365125"/>
+          </a:xfrm>
+          <a:prstGeom prst="rect">
+            <a:avLst/>
+          </a:prstGeom>
+        </p:spPr>
         <p:txBody>
           <a:bodyPr/>
           <a:lstStyle/>
@@ -3452,125 +3668,6 @@
               <a:rPr lang="en-US"/>
               <a:t>Fifth level</a:t>
             </a:r>
-            <a:endParaRPr lang="en-US" dirty="0"/>
-          </a:p>
-        </p:txBody>
-      </p:sp>
-      <p:sp>
-        <p:nvSpPr>
-          <p:cNvPr id="4" name="Date Placeholder 3"/>
-          <p:cNvSpPr>
-            <a:spLocks noGrp="1"/>
-          </p:cNvSpPr>
-          <p:nvPr>
-            <p:ph type="dt" sz="half" idx="2"/>
-          </p:nvPr>
-        </p:nvSpPr>
-        <p:spPr>
-          <a:xfrm>
-            <a:off x="838200" y="6356350"/>
-            <a:ext cx="2743200" cy="365125"/>
-          </a:xfrm>
-          <a:prstGeom prst="rect">
-            <a:avLst/>
-          </a:prstGeom>
-        </p:spPr>
-        <p:txBody>
-          <a:bodyPr vert="horz" lIns="91440" tIns="45720" rIns="91440" bIns="45720" rtlCol="0" anchor="ctr"/>
-          <a:lstStyle>
-            <a:lvl1pPr algn="l">
-              <a:defRPr sz="1200">
-                <a:solidFill>
-                  <a:schemeClr val="tx1">
-                    <a:tint val="75000"/>
-                  </a:schemeClr>
-                </a:solidFill>
-              </a:defRPr>
-            </a:lvl1pPr>
-          </a:lstStyle>
-          <a:p>
-            <a:fld id="{C764DE79-268F-4C1A-8933-263129D2AF90}" type="datetimeFigureOut">
-              <a:rPr lang="en-US" smtClean="0"/>
-              <a:t>11/10/19</a:t>
-            </a:fld>
-            <a:endParaRPr lang="en-US" dirty="0"/>
-          </a:p>
-        </p:txBody>
-      </p:sp>
-      <p:sp>
-        <p:nvSpPr>
-          <p:cNvPr id="5" name="Footer Placeholder 4"/>
-          <p:cNvSpPr>
-            <a:spLocks noGrp="1"/>
-          </p:cNvSpPr>
-          <p:nvPr>
-            <p:ph type="ftr" sz="quarter" idx="3"/>
-          </p:nvPr>
-        </p:nvSpPr>
-        <p:spPr>
-          <a:xfrm>
-            <a:off x="4038600" y="6356350"/>
-            <a:ext cx="4114800" cy="365125"/>
-          </a:xfrm>
-          <a:prstGeom prst="rect">
-            <a:avLst/>
-          </a:prstGeom>
-        </p:spPr>
-        <p:txBody>
-          <a:bodyPr vert="horz" lIns="91440" tIns="45720" rIns="91440" bIns="45720" rtlCol="0" anchor="ctr"/>
-          <a:lstStyle>
-            <a:lvl1pPr algn="ctr">
-              <a:defRPr sz="1200">
-                <a:solidFill>
-                  <a:schemeClr val="tx1">
-                    <a:tint val="75000"/>
-                  </a:schemeClr>
-                </a:solidFill>
-              </a:defRPr>
-            </a:lvl1pPr>
-          </a:lstStyle>
-          <a:p>
-            <a:endParaRPr lang="en-US" dirty="0"/>
-          </a:p>
-        </p:txBody>
-      </p:sp>
-      <p:sp>
-        <p:nvSpPr>
-          <p:cNvPr id="6" name="Slide Number Placeholder 5"/>
-          <p:cNvSpPr>
-            <a:spLocks noGrp="1"/>
-          </p:cNvSpPr>
-          <p:nvPr>
-            <p:ph type="sldNum" sz="quarter" idx="4"/>
-          </p:nvPr>
-        </p:nvSpPr>
-        <p:spPr>
-          <a:xfrm>
-            <a:off x="8610600" y="6356350"/>
-            <a:ext cx="2743200" cy="365125"/>
-          </a:xfrm>
-          <a:prstGeom prst="rect">
-            <a:avLst/>
-          </a:prstGeom>
-        </p:spPr>
-        <p:txBody>
-          <a:bodyPr vert="horz" lIns="91440" tIns="45720" rIns="91440" bIns="45720" rtlCol="0" anchor="ctr"/>
-          <a:lstStyle>
-            <a:lvl1pPr algn="r">
-              <a:defRPr sz="1200">
-                <a:solidFill>
-                  <a:schemeClr val="tx1">
-                    <a:tint val="75000"/>
-                  </a:schemeClr>
-                </a:solidFill>
-              </a:defRPr>
-            </a:lvl1pPr>
-          </a:lstStyle>
-          <a:p>
-            <a:fld id="{0B973F48-4628-F846-BA33-DDE653D83577}" type="slidenum">
-              <a:rPr lang="en-US" smtClean="0"/>
-              <a:t>‹#›</a:t>
-            </a:fld>
             <a:endParaRPr lang="en-US" dirty="0"/>
           </a:p>
         </p:txBody>
@@ -3790,7 +3887,7 @@
         </p:nvSpPr>
         <p:spPr bwMode="auto">
           <a:xfrm>
-            <a:off x="0" y="6430966"/>
+            <a:off x="0" y="6464526"/>
             <a:ext cx="6705600" cy="323165"/>
           </a:xfrm>
           <a:prstGeom prst="rect">
@@ -3802,14 +3899,14 @@
           </a:ln>
           <a:extLst>
             <a:ext uri="{909E8E84-426E-40dd-AFC4-6F175D3DCCD1}">
-              <a14:hiddenFill xmlns:a14="http://schemas.microsoft.com/office/drawing/2010/main" xmlns="">
+              <a14:hiddenFill xmlns="" xmlns:a14="http://schemas.microsoft.com/office/drawing/2010/main">
                 <a:solidFill>
                   <a:srgbClr val="FFFFFF"/>
                 </a:solidFill>
               </a14:hiddenFill>
             </a:ext>
             <a:ext uri="{91240B29-F687-4f45-9708-019B960494DF}">
-              <a14:hiddenLine xmlns:a14="http://schemas.microsoft.com/office/drawing/2010/main" xmlns="" w="9525">
+              <a14:hiddenLine xmlns="" xmlns:a14="http://schemas.microsoft.com/office/drawing/2010/main" w="9525">
                 <a:solidFill>
                   <a:srgbClr val="000000"/>
                 </a:solidFill>
@@ -3963,7 +4060,7 @@
         </p:nvSpPr>
         <p:spPr>
           <a:xfrm>
-            <a:off x="9639300" y="6400802"/>
+            <a:off x="9639300" y="6441442"/>
             <a:ext cx="2362200" cy="369332"/>
           </a:xfrm>
           <a:prstGeom prst="rect">
@@ -4441,14 +4538,14 @@
           </a:ln>
           <a:extLst>
             <a:ext uri="{909E8E84-426E-40dd-AFC4-6F175D3DCCD1}">
-              <a14:hiddenFill xmlns:a14="http://schemas.microsoft.com/office/drawing/2010/main" xmlns="">
+              <a14:hiddenFill xmlns="" xmlns:a14="http://schemas.microsoft.com/office/drawing/2010/main">
                 <a:solidFill>
                   <a:srgbClr val="FFFFFF"/>
                 </a:solidFill>
               </a14:hiddenFill>
             </a:ext>
             <a:ext uri="{91240B29-F687-4f45-9708-019B960494DF}">
-              <a14:hiddenLine xmlns:a14="http://schemas.microsoft.com/office/drawing/2010/main" xmlns="" w="9525">
+              <a14:hiddenLine xmlns="" xmlns:a14="http://schemas.microsoft.com/office/drawing/2010/main" w="9525">
                 <a:solidFill>
                   <a:srgbClr val="000000"/>
                 </a:solidFill>
@@ -4772,14 +4869,14 @@
             </a:ln>
             <a:extLst>
               <a:ext uri="{909E8E84-426E-40dd-AFC4-6F175D3DCCD1}">
-                <a14:hiddenFill xmlns="" xmlns:a14="http://schemas.microsoft.com/office/drawing/2010/main">
+                <a14:hiddenFill xmlns:a14="http://schemas.microsoft.com/office/drawing/2010/main" xmlns="">
                   <a:solidFill>
                     <a:srgbClr val="FFFFFF"/>
                   </a:solidFill>
                 </a14:hiddenFill>
               </a:ext>
               <a:ext uri="{91240B29-F687-4f45-9708-019B960494DF}">
-                <a14:hiddenLine xmlns="" xmlns:a14="http://schemas.microsoft.com/office/drawing/2010/main" w="9525">
+                <a14:hiddenLine xmlns:a14="http://schemas.microsoft.com/office/drawing/2010/main" xmlns="" w="9525">
                   <a:solidFill>
                     <a:srgbClr val="000000"/>
                   </a:solidFill>
@@ -4923,14 +5020,14 @@
             </a:ln>
             <a:extLst>
               <a:ext uri="{909E8E84-426E-40dd-AFC4-6F175D3DCCD1}">
-                <a14:hiddenFill xmlns="" xmlns:a14="http://schemas.microsoft.com/office/drawing/2010/main">
+                <a14:hiddenFill xmlns:a14="http://schemas.microsoft.com/office/drawing/2010/main" xmlns="">
                   <a:solidFill>
                     <a:srgbClr val="FFFFFF"/>
                   </a:solidFill>
                 </a14:hiddenFill>
               </a:ext>
               <a:ext uri="{91240B29-F687-4f45-9708-019B960494DF}">
-                <a14:hiddenLine xmlns="" xmlns:a14="http://schemas.microsoft.com/office/drawing/2010/main" w="9525">
+                <a14:hiddenLine xmlns:a14="http://schemas.microsoft.com/office/drawing/2010/main" xmlns="" w="9525">
                   <a:solidFill>
                     <a:srgbClr val="000000"/>
                   </a:solidFill>

</xml_diff>